<commit_message>
G 2018 Ch 3-4
</commit_message>
<xml_diff>
--- a/programming/2018/ch_3_storage.pptx
+++ b/programming/2018/ch_3_storage.pptx
@@ -284,7 +284,7 @@
               <a:pPr>
                 <a:defRPr/>
               </a:pPr>
-              <a:t>2020/9/25</a:t>
+              <a:t>2020/10/13</a:t>
             </a:fld>
             <a:endParaRPr lang="zh-CN" altLang="en-US"/>
           </a:p>
@@ -504,7 +504,7 @@
               <a:pPr>
                 <a:defRPr/>
               </a:pPr>
-              <a:t>2020/9/25</a:t>
+              <a:t>2020/10/13</a:t>
             </a:fld>
             <a:endParaRPr lang="en-US"/>
           </a:p>
@@ -589,35 +589,35 @@
           <a:p>
             <a:pPr lvl="0"/>
             <a:r>
-              <a:rPr lang="zh-CN" altLang="en-US" noProof="0" smtClean="0"/>
+              <a:rPr lang="zh-CN" altLang="en-US" noProof="0"/>
               <a:t>单击此处编辑母版文本样式</a:t>
             </a:r>
           </a:p>
           <a:p>
             <a:pPr lvl="1"/>
             <a:r>
-              <a:rPr lang="zh-CN" altLang="en-US" noProof="0" smtClean="0"/>
+              <a:rPr lang="zh-CN" altLang="en-US" noProof="0"/>
               <a:t>第二级</a:t>
             </a:r>
           </a:p>
           <a:p>
             <a:pPr lvl="2"/>
             <a:r>
-              <a:rPr lang="zh-CN" altLang="en-US" noProof="0" smtClean="0"/>
+              <a:rPr lang="zh-CN" altLang="en-US" noProof="0"/>
               <a:t>第三级</a:t>
             </a:r>
           </a:p>
           <a:p>
             <a:pPr lvl="3"/>
             <a:r>
-              <a:rPr lang="zh-CN" altLang="en-US" noProof="0" smtClean="0"/>
+              <a:rPr lang="zh-CN" altLang="en-US" noProof="0"/>
               <a:t>第四级</a:t>
             </a:r>
           </a:p>
           <a:p>
             <a:pPr lvl="4"/>
             <a:r>
-              <a:rPr lang="zh-CN" altLang="en-US" noProof="0" smtClean="0"/>
+              <a:rPr lang="zh-CN" altLang="en-US" noProof="0"/>
               <a:t>第五级</a:t>
             </a:r>
           </a:p>
@@ -900,10 +900,9 @@
           <a:lstStyle/>
           <a:p>
             <a:r>
-              <a:rPr lang="zh-CN" altLang="en-US" smtClean="0"/>
+              <a:rPr lang="zh-CN" altLang="en-US"/>
               <a:t>单击此处编辑母版标题样式</a:t>
             </a:r>
-            <a:endParaRPr lang="zh-CN" altLang="en-US"/>
           </a:p>
         </p:txBody>
       </p:sp>
@@ -1022,10 +1021,9 @@
           </a:lstStyle>
           <a:p>
             <a:r>
-              <a:rPr lang="zh-CN" altLang="en-US" smtClean="0"/>
+              <a:rPr lang="zh-CN" altLang="en-US"/>
               <a:t>单击此处编辑母版副标题样式</a:t>
             </a:r>
-            <a:endParaRPr lang="zh-CN" altLang="en-US"/>
           </a:p>
         </p:txBody>
       </p:sp>
@@ -1067,7 +1065,7 @@
               <a:pPr>
                 <a:defRPr/>
               </a:pPr>
-              <a:t>2020/9/25</a:t>
+              <a:t>2020/10/13</a:t>
             </a:fld>
             <a:endParaRPr lang="zh-CN" altLang="en-US"/>
           </a:p>
@@ -1208,10 +1206,9 @@
           <a:lstStyle/>
           <a:p>
             <a:r>
-              <a:rPr lang="zh-CN" altLang="en-US" smtClean="0"/>
+              <a:rPr lang="zh-CN" altLang="en-US"/>
               <a:t>单击此处编辑母版标题样式</a:t>
             </a:r>
-            <a:endParaRPr lang="zh-CN" altLang="en-US"/>
           </a:p>
         </p:txBody>
       </p:sp>
@@ -1240,38 +1237,37 @@
           <a:p>
             <a:pPr lvl="0"/>
             <a:r>
-              <a:rPr lang="zh-CN" altLang="en-US" smtClean="0"/>
+              <a:rPr lang="zh-CN" altLang="en-US"/>
               <a:t>单击此处编辑母版文本样式</a:t>
             </a:r>
           </a:p>
           <a:p>
             <a:pPr lvl="1"/>
             <a:r>
-              <a:rPr lang="zh-CN" altLang="en-US" smtClean="0"/>
+              <a:rPr lang="zh-CN" altLang="en-US"/>
               <a:t>第二级</a:t>
             </a:r>
           </a:p>
           <a:p>
             <a:pPr lvl="2"/>
             <a:r>
-              <a:rPr lang="zh-CN" altLang="en-US" smtClean="0"/>
+              <a:rPr lang="zh-CN" altLang="en-US"/>
               <a:t>第三级</a:t>
             </a:r>
           </a:p>
           <a:p>
             <a:pPr lvl="3"/>
             <a:r>
-              <a:rPr lang="zh-CN" altLang="en-US" smtClean="0"/>
+              <a:rPr lang="zh-CN" altLang="en-US"/>
               <a:t>第四级</a:t>
             </a:r>
           </a:p>
           <a:p>
             <a:pPr lvl="4"/>
             <a:r>
-              <a:rPr lang="zh-CN" altLang="en-US" smtClean="0"/>
+              <a:rPr lang="zh-CN" altLang="en-US"/>
               <a:t>第五级</a:t>
             </a:r>
-            <a:endParaRPr lang="zh-CN" altLang="en-US"/>
           </a:p>
         </p:txBody>
       </p:sp>
@@ -1313,7 +1309,7 @@
               <a:pPr>
                 <a:defRPr/>
               </a:pPr>
-              <a:t>2020/9/25</a:t>
+              <a:t>2020/10/13</a:t>
             </a:fld>
             <a:endParaRPr lang="zh-CN" altLang="en-US"/>
           </a:p>
@@ -1454,10 +1450,9 @@
           <a:lstStyle/>
           <a:p>
             <a:r>
-              <a:rPr lang="zh-CN" altLang="en-US" smtClean="0"/>
+              <a:rPr lang="zh-CN" altLang="en-US"/>
               <a:t>单击此处编辑母版标题样式</a:t>
             </a:r>
-            <a:endParaRPr lang="zh-CN" altLang="en-US"/>
           </a:p>
         </p:txBody>
       </p:sp>
@@ -1486,38 +1481,37 @@
           <a:p>
             <a:pPr lvl="0"/>
             <a:r>
-              <a:rPr lang="zh-CN" altLang="en-US" smtClean="0"/>
+              <a:rPr lang="zh-CN" altLang="en-US"/>
               <a:t>单击此处编辑母版文本样式</a:t>
             </a:r>
           </a:p>
           <a:p>
             <a:pPr lvl="1"/>
             <a:r>
-              <a:rPr lang="zh-CN" altLang="en-US" smtClean="0"/>
+              <a:rPr lang="zh-CN" altLang="en-US"/>
               <a:t>第二级</a:t>
             </a:r>
           </a:p>
           <a:p>
             <a:pPr lvl="2"/>
             <a:r>
-              <a:rPr lang="zh-CN" altLang="en-US" smtClean="0"/>
+              <a:rPr lang="zh-CN" altLang="en-US"/>
               <a:t>第三级</a:t>
             </a:r>
           </a:p>
           <a:p>
             <a:pPr lvl="3"/>
             <a:r>
-              <a:rPr lang="zh-CN" altLang="en-US" smtClean="0"/>
+              <a:rPr lang="zh-CN" altLang="en-US"/>
               <a:t>第四级</a:t>
             </a:r>
           </a:p>
           <a:p>
             <a:pPr lvl="4"/>
             <a:r>
-              <a:rPr lang="zh-CN" altLang="en-US" smtClean="0"/>
+              <a:rPr lang="zh-CN" altLang="en-US"/>
               <a:t>第五级</a:t>
             </a:r>
-            <a:endParaRPr lang="zh-CN" altLang="en-US"/>
           </a:p>
         </p:txBody>
       </p:sp>
@@ -1559,7 +1553,7 @@
               <a:pPr>
                 <a:defRPr/>
               </a:pPr>
-              <a:t>2020/9/25</a:t>
+              <a:t>2020/10/13</a:t>
             </a:fld>
             <a:endParaRPr lang="zh-CN" altLang="en-US"/>
           </a:p>
@@ -1700,10 +1694,9 @@
           <a:lstStyle/>
           <a:p>
             <a:r>
-              <a:rPr lang="zh-CN" altLang="en-US" smtClean="0"/>
+              <a:rPr lang="zh-CN" altLang="en-US"/>
               <a:t>单击此处编辑母版标题样式</a:t>
             </a:r>
-            <a:endParaRPr lang="zh-CN" altLang="en-US"/>
           </a:p>
         </p:txBody>
       </p:sp>
@@ -1822,10 +1815,9 @@
           </a:lstStyle>
           <a:p>
             <a:r>
-              <a:rPr lang="zh-CN" altLang="en-US" smtClean="0"/>
+              <a:rPr lang="zh-CN" altLang="en-US"/>
               <a:t>单击此处编辑母版副标题样式</a:t>
             </a:r>
-            <a:endParaRPr lang="zh-CN" altLang="en-US"/>
           </a:p>
         </p:txBody>
       </p:sp>
@@ -1867,7 +1859,7 @@
               <a:pPr>
                 <a:defRPr/>
               </a:pPr>
-              <a:t>2020/9/25</a:t>
+              <a:t>2020/10/13</a:t>
             </a:fld>
             <a:endParaRPr lang="zh-CN" altLang="en-US"/>
           </a:p>
@@ -2008,10 +2000,9 @@
           <a:lstStyle/>
           <a:p>
             <a:r>
-              <a:rPr lang="zh-CN" altLang="en-US" smtClean="0"/>
+              <a:rPr lang="zh-CN" altLang="en-US"/>
               <a:t>单击此处编辑母版标题样式</a:t>
             </a:r>
-            <a:endParaRPr lang="zh-CN" altLang="en-US"/>
           </a:p>
         </p:txBody>
       </p:sp>
@@ -2040,38 +2031,37 @@
           <a:p>
             <a:pPr lvl="0"/>
             <a:r>
-              <a:rPr lang="zh-CN" altLang="en-US" smtClean="0"/>
+              <a:rPr lang="zh-CN" altLang="en-US"/>
               <a:t>单击此处编辑母版文本样式</a:t>
             </a:r>
           </a:p>
           <a:p>
             <a:pPr lvl="1"/>
             <a:r>
-              <a:rPr lang="zh-CN" altLang="en-US" smtClean="0"/>
+              <a:rPr lang="zh-CN" altLang="en-US"/>
               <a:t>第二级</a:t>
             </a:r>
           </a:p>
           <a:p>
             <a:pPr lvl="2"/>
             <a:r>
-              <a:rPr lang="zh-CN" altLang="en-US" smtClean="0"/>
+              <a:rPr lang="zh-CN" altLang="en-US"/>
               <a:t>第三级</a:t>
             </a:r>
           </a:p>
           <a:p>
             <a:pPr lvl="3"/>
             <a:r>
-              <a:rPr lang="zh-CN" altLang="en-US" smtClean="0"/>
+              <a:rPr lang="zh-CN" altLang="en-US"/>
               <a:t>第四级</a:t>
             </a:r>
           </a:p>
           <a:p>
             <a:pPr lvl="4"/>
             <a:r>
-              <a:rPr lang="zh-CN" altLang="en-US" smtClean="0"/>
+              <a:rPr lang="zh-CN" altLang="en-US"/>
               <a:t>第五级</a:t>
             </a:r>
-            <a:endParaRPr lang="zh-CN" altLang="en-US"/>
           </a:p>
         </p:txBody>
       </p:sp>
@@ -2113,7 +2103,7 @@
               <a:pPr>
                 <a:defRPr/>
               </a:pPr>
-              <a:t>2020/9/25</a:t>
+              <a:t>2020/10/13</a:t>
             </a:fld>
             <a:endParaRPr lang="zh-CN" altLang="en-US"/>
           </a:p>
@@ -2258,10 +2248,9 @@
           </a:lstStyle>
           <a:p>
             <a:r>
-              <a:rPr lang="zh-CN" altLang="en-US" smtClean="0"/>
+              <a:rPr lang="zh-CN" altLang="en-US"/>
               <a:t>单击此处编辑母版标题样式</a:t>
             </a:r>
-            <a:endParaRPr lang="zh-CN" altLang="en-US"/>
           </a:p>
         </p:txBody>
       </p:sp>
@@ -2381,7 +2370,7 @@
           <a:p>
             <a:pPr lvl="0"/>
             <a:r>
-              <a:rPr lang="zh-CN" altLang="en-US" smtClean="0"/>
+              <a:rPr lang="zh-CN" altLang="en-US"/>
               <a:t>单击此处编辑母版文本样式</a:t>
             </a:r>
           </a:p>
@@ -2425,7 +2414,7 @@
               <a:pPr>
                 <a:defRPr/>
               </a:pPr>
-              <a:t>2020/9/25</a:t>
+              <a:t>2020/10/13</a:t>
             </a:fld>
             <a:endParaRPr lang="zh-CN" altLang="en-US"/>
           </a:p>
@@ -2566,10 +2555,9 @@
           <a:lstStyle/>
           <a:p>
             <a:r>
-              <a:rPr lang="zh-CN" altLang="en-US" smtClean="0"/>
+              <a:rPr lang="zh-CN" altLang="en-US"/>
               <a:t>单击此处编辑母版标题样式</a:t>
             </a:r>
-            <a:endParaRPr lang="zh-CN" altLang="en-US"/>
           </a:p>
         </p:txBody>
       </p:sp>
@@ -2626,38 +2614,37 @@
           <a:p>
             <a:pPr lvl="0"/>
             <a:r>
-              <a:rPr lang="zh-CN" altLang="en-US" smtClean="0"/>
+              <a:rPr lang="zh-CN" altLang="en-US"/>
               <a:t>单击此处编辑母版文本样式</a:t>
             </a:r>
           </a:p>
           <a:p>
             <a:pPr lvl="1"/>
             <a:r>
-              <a:rPr lang="zh-CN" altLang="en-US" smtClean="0"/>
+              <a:rPr lang="zh-CN" altLang="en-US"/>
               <a:t>第二级</a:t>
             </a:r>
           </a:p>
           <a:p>
             <a:pPr lvl="2"/>
             <a:r>
-              <a:rPr lang="zh-CN" altLang="en-US" smtClean="0"/>
+              <a:rPr lang="zh-CN" altLang="en-US"/>
               <a:t>第三级</a:t>
             </a:r>
           </a:p>
           <a:p>
             <a:pPr lvl="3"/>
             <a:r>
-              <a:rPr lang="zh-CN" altLang="en-US" smtClean="0"/>
+              <a:rPr lang="zh-CN" altLang="en-US"/>
               <a:t>第四级</a:t>
             </a:r>
           </a:p>
           <a:p>
             <a:pPr lvl="4"/>
             <a:r>
-              <a:rPr lang="zh-CN" altLang="en-US" smtClean="0"/>
+              <a:rPr lang="zh-CN" altLang="en-US"/>
               <a:t>第五级</a:t>
             </a:r>
-            <a:endParaRPr lang="zh-CN" altLang="en-US"/>
           </a:p>
         </p:txBody>
       </p:sp>
@@ -2714,38 +2701,37 @@
           <a:p>
             <a:pPr lvl="0"/>
             <a:r>
-              <a:rPr lang="zh-CN" altLang="en-US" smtClean="0"/>
+              <a:rPr lang="zh-CN" altLang="en-US"/>
               <a:t>单击此处编辑母版文本样式</a:t>
             </a:r>
           </a:p>
           <a:p>
             <a:pPr lvl="1"/>
             <a:r>
-              <a:rPr lang="zh-CN" altLang="en-US" smtClean="0"/>
+              <a:rPr lang="zh-CN" altLang="en-US"/>
               <a:t>第二级</a:t>
             </a:r>
           </a:p>
           <a:p>
             <a:pPr lvl="2"/>
             <a:r>
-              <a:rPr lang="zh-CN" altLang="en-US" smtClean="0"/>
+              <a:rPr lang="zh-CN" altLang="en-US"/>
               <a:t>第三级</a:t>
             </a:r>
           </a:p>
           <a:p>
             <a:pPr lvl="3"/>
             <a:r>
-              <a:rPr lang="zh-CN" altLang="en-US" smtClean="0"/>
+              <a:rPr lang="zh-CN" altLang="en-US"/>
               <a:t>第四级</a:t>
             </a:r>
           </a:p>
           <a:p>
             <a:pPr lvl="4"/>
             <a:r>
-              <a:rPr lang="zh-CN" altLang="en-US" smtClean="0"/>
+              <a:rPr lang="zh-CN" altLang="en-US"/>
               <a:t>第五级</a:t>
             </a:r>
-            <a:endParaRPr lang="zh-CN" altLang="en-US"/>
           </a:p>
         </p:txBody>
       </p:sp>
@@ -2787,7 +2773,7 @@
               <a:pPr>
                 <a:defRPr/>
               </a:pPr>
-              <a:t>2020/9/25</a:t>
+              <a:t>2020/10/13</a:t>
             </a:fld>
             <a:endParaRPr lang="zh-CN" altLang="en-US"/>
           </a:p>
@@ -2932,10 +2918,9 @@
           </a:lstStyle>
           <a:p>
             <a:r>
-              <a:rPr lang="zh-CN" altLang="en-US" smtClean="0"/>
+              <a:rPr lang="zh-CN" altLang="en-US"/>
               <a:t>单击此处编辑母版标题样式</a:t>
             </a:r>
-            <a:endParaRPr lang="zh-CN" altLang="en-US"/>
           </a:p>
         </p:txBody>
       </p:sp>
@@ -3001,7 +2986,7 @@
           <a:p>
             <a:pPr lvl="0"/>
             <a:r>
-              <a:rPr lang="zh-CN" altLang="en-US" smtClean="0"/>
+              <a:rPr lang="zh-CN" altLang="en-US"/>
               <a:t>单击此处编辑母版文本样式</a:t>
             </a:r>
           </a:p>
@@ -3060,38 +3045,37 @@
           <a:p>
             <a:pPr lvl="0"/>
             <a:r>
-              <a:rPr lang="zh-CN" altLang="en-US" smtClean="0"/>
+              <a:rPr lang="zh-CN" altLang="en-US"/>
               <a:t>单击此处编辑母版文本样式</a:t>
             </a:r>
           </a:p>
           <a:p>
             <a:pPr lvl="1"/>
             <a:r>
-              <a:rPr lang="zh-CN" altLang="en-US" smtClean="0"/>
+              <a:rPr lang="zh-CN" altLang="en-US"/>
               <a:t>第二级</a:t>
             </a:r>
           </a:p>
           <a:p>
             <a:pPr lvl="2"/>
             <a:r>
-              <a:rPr lang="zh-CN" altLang="en-US" smtClean="0"/>
+              <a:rPr lang="zh-CN" altLang="en-US"/>
               <a:t>第三级</a:t>
             </a:r>
           </a:p>
           <a:p>
             <a:pPr lvl="3"/>
             <a:r>
-              <a:rPr lang="zh-CN" altLang="en-US" smtClean="0"/>
+              <a:rPr lang="zh-CN" altLang="en-US"/>
               <a:t>第四级</a:t>
             </a:r>
           </a:p>
           <a:p>
             <a:pPr lvl="4"/>
             <a:r>
-              <a:rPr lang="zh-CN" altLang="en-US" smtClean="0"/>
+              <a:rPr lang="zh-CN" altLang="en-US"/>
               <a:t>第五级</a:t>
             </a:r>
-            <a:endParaRPr lang="zh-CN" altLang="en-US"/>
           </a:p>
         </p:txBody>
       </p:sp>
@@ -3157,7 +3141,7 @@
           <a:p>
             <a:pPr lvl="0"/>
             <a:r>
-              <a:rPr lang="zh-CN" altLang="en-US" smtClean="0"/>
+              <a:rPr lang="zh-CN" altLang="en-US"/>
               <a:t>单击此处编辑母版文本样式</a:t>
             </a:r>
           </a:p>
@@ -3216,38 +3200,37 @@
           <a:p>
             <a:pPr lvl="0"/>
             <a:r>
-              <a:rPr lang="zh-CN" altLang="en-US" smtClean="0"/>
+              <a:rPr lang="zh-CN" altLang="en-US"/>
               <a:t>单击此处编辑母版文本样式</a:t>
             </a:r>
           </a:p>
           <a:p>
             <a:pPr lvl="1"/>
             <a:r>
-              <a:rPr lang="zh-CN" altLang="en-US" smtClean="0"/>
+              <a:rPr lang="zh-CN" altLang="en-US"/>
               <a:t>第二级</a:t>
             </a:r>
           </a:p>
           <a:p>
             <a:pPr lvl="2"/>
             <a:r>
-              <a:rPr lang="zh-CN" altLang="en-US" smtClean="0"/>
+              <a:rPr lang="zh-CN" altLang="en-US"/>
               <a:t>第三级</a:t>
             </a:r>
           </a:p>
           <a:p>
             <a:pPr lvl="3"/>
             <a:r>
-              <a:rPr lang="zh-CN" altLang="en-US" smtClean="0"/>
+              <a:rPr lang="zh-CN" altLang="en-US"/>
               <a:t>第四级</a:t>
             </a:r>
           </a:p>
           <a:p>
             <a:pPr lvl="4"/>
             <a:r>
-              <a:rPr lang="zh-CN" altLang="en-US" smtClean="0"/>
+              <a:rPr lang="zh-CN" altLang="en-US"/>
               <a:t>第五级</a:t>
             </a:r>
-            <a:endParaRPr lang="zh-CN" altLang="en-US"/>
           </a:p>
         </p:txBody>
       </p:sp>
@@ -3289,7 +3272,7 @@
               <a:pPr>
                 <a:defRPr/>
               </a:pPr>
-              <a:t>2020/9/25</a:t>
+              <a:t>2020/10/13</a:t>
             </a:fld>
             <a:endParaRPr lang="zh-CN" altLang="en-US"/>
           </a:p>
@@ -3430,10 +3413,9 @@
           <a:lstStyle/>
           <a:p>
             <a:r>
-              <a:rPr lang="zh-CN" altLang="en-US" smtClean="0"/>
+              <a:rPr lang="zh-CN" altLang="en-US"/>
               <a:t>单击此处编辑母版标题样式</a:t>
             </a:r>
-            <a:endParaRPr lang="zh-CN" altLang="en-US"/>
           </a:p>
         </p:txBody>
       </p:sp>
@@ -3475,7 +3457,7 @@
               <a:pPr>
                 <a:defRPr/>
               </a:pPr>
-              <a:t>2020/9/25</a:t>
+              <a:t>2020/10/13</a:t>
             </a:fld>
             <a:endParaRPr lang="zh-CN" altLang="en-US"/>
           </a:p>
@@ -3630,7 +3612,7 @@
               <a:pPr>
                 <a:defRPr/>
               </a:pPr>
-              <a:t>2020/9/25</a:t>
+              <a:t>2020/10/13</a:t>
             </a:fld>
             <a:endParaRPr lang="zh-CN" altLang="en-US"/>
           </a:p>
@@ -3775,10 +3757,9 @@
           </a:lstStyle>
           <a:p>
             <a:r>
-              <a:rPr lang="zh-CN" altLang="en-US" smtClean="0"/>
+              <a:rPr lang="zh-CN" altLang="en-US"/>
               <a:t>单击此处编辑母版标题样式</a:t>
             </a:r>
-            <a:endParaRPr lang="zh-CN" altLang="en-US"/>
           </a:p>
         </p:txBody>
       </p:sp>
@@ -3835,38 +3816,37 @@
           <a:p>
             <a:pPr lvl="0"/>
             <a:r>
-              <a:rPr lang="zh-CN" altLang="en-US" smtClean="0"/>
+              <a:rPr lang="zh-CN" altLang="en-US"/>
               <a:t>单击此处编辑母版文本样式</a:t>
             </a:r>
           </a:p>
           <a:p>
             <a:pPr lvl="1"/>
             <a:r>
-              <a:rPr lang="zh-CN" altLang="en-US" smtClean="0"/>
+              <a:rPr lang="zh-CN" altLang="en-US"/>
               <a:t>第二级</a:t>
             </a:r>
           </a:p>
           <a:p>
             <a:pPr lvl="2"/>
             <a:r>
-              <a:rPr lang="zh-CN" altLang="en-US" smtClean="0"/>
+              <a:rPr lang="zh-CN" altLang="en-US"/>
               <a:t>第三级</a:t>
             </a:r>
           </a:p>
           <a:p>
             <a:pPr lvl="3"/>
             <a:r>
-              <a:rPr lang="zh-CN" altLang="en-US" smtClean="0"/>
+              <a:rPr lang="zh-CN" altLang="en-US"/>
               <a:t>第四级</a:t>
             </a:r>
           </a:p>
           <a:p>
             <a:pPr lvl="4"/>
             <a:r>
-              <a:rPr lang="zh-CN" altLang="en-US" smtClean="0"/>
+              <a:rPr lang="zh-CN" altLang="en-US"/>
               <a:t>第五级</a:t>
             </a:r>
-            <a:endParaRPr lang="zh-CN" altLang="en-US"/>
           </a:p>
         </p:txBody>
       </p:sp>
@@ -3932,7 +3912,7 @@
           <a:p>
             <a:pPr lvl="0"/>
             <a:r>
-              <a:rPr lang="zh-CN" altLang="en-US" smtClean="0"/>
+              <a:rPr lang="zh-CN" altLang="en-US"/>
               <a:t>单击此处编辑母版文本样式</a:t>
             </a:r>
           </a:p>
@@ -3976,7 +3956,7 @@
               <a:pPr>
                 <a:defRPr/>
               </a:pPr>
-              <a:t>2020/9/25</a:t>
+              <a:t>2020/10/13</a:t>
             </a:fld>
             <a:endParaRPr lang="zh-CN" altLang="en-US"/>
           </a:p>
@@ -4117,10 +4097,9 @@
           <a:lstStyle/>
           <a:p>
             <a:r>
-              <a:rPr lang="zh-CN" altLang="en-US" smtClean="0"/>
+              <a:rPr lang="zh-CN" altLang="en-US"/>
               <a:t>单击此处编辑母版标题样式</a:t>
             </a:r>
-            <a:endParaRPr lang="zh-CN" altLang="en-US"/>
           </a:p>
         </p:txBody>
       </p:sp>
@@ -4149,38 +4128,37 @@
           <a:p>
             <a:pPr lvl="0"/>
             <a:r>
-              <a:rPr lang="zh-CN" altLang="en-US" smtClean="0"/>
+              <a:rPr lang="zh-CN" altLang="en-US"/>
               <a:t>单击此处编辑母版文本样式</a:t>
             </a:r>
           </a:p>
           <a:p>
             <a:pPr lvl="1"/>
             <a:r>
-              <a:rPr lang="zh-CN" altLang="en-US" smtClean="0"/>
+              <a:rPr lang="zh-CN" altLang="en-US"/>
               <a:t>第二级</a:t>
             </a:r>
           </a:p>
           <a:p>
             <a:pPr lvl="2"/>
             <a:r>
-              <a:rPr lang="zh-CN" altLang="en-US" smtClean="0"/>
+              <a:rPr lang="zh-CN" altLang="en-US"/>
               <a:t>第三级</a:t>
             </a:r>
           </a:p>
           <a:p>
             <a:pPr lvl="3"/>
             <a:r>
-              <a:rPr lang="zh-CN" altLang="en-US" smtClean="0"/>
+              <a:rPr lang="zh-CN" altLang="en-US"/>
               <a:t>第四级</a:t>
             </a:r>
           </a:p>
           <a:p>
             <a:pPr lvl="4"/>
             <a:r>
-              <a:rPr lang="zh-CN" altLang="en-US" smtClean="0"/>
+              <a:rPr lang="zh-CN" altLang="en-US"/>
               <a:t>第五级</a:t>
             </a:r>
-            <a:endParaRPr lang="zh-CN" altLang="en-US"/>
           </a:p>
         </p:txBody>
       </p:sp>
@@ -4279,10 +4257,9 @@
           </a:lstStyle>
           <a:p>
             <a:r>
-              <a:rPr lang="zh-CN" altLang="en-US" smtClean="0"/>
+              <a:rPr lang="zh-CN" altLang="en-US"/>
               <a:t>单击此处编辑母版标题样式</a:t>
             </a:r>
-            <a:endParaRPr lang="zh-CN" altLang="en-US"/>
           </a:p>
         </p:txBody>
       </p:sp>
@@ -4347,7 +4324,7 @@
           </a:lstStyle>
           <a:p>
             <a:pPr lvl="0"/>
-            <a:endParaRPr lang="zh-CN" altLang="en-US" noProof="0" smtClean="0"/>
+            <a:endParaRPr lang="zh-CN" altLang="en-US" noProof="0"/>
           </a:p>
         </p:txBody>
       </p:sp>
@@ -4413,7 +4390,7 @@
           <a:p>
             <a:pPr lvl="0"/>
             <a:r>
-              <a:rPr lang="zh-CN" altLang="en-US" smtClean="0"/>
+              <a:rPr lang="zh-CN" altLang="en-US"/>
               <a:t>单击此处编辑母版文本样式</a:t>
             </a:r>
           </a:p>
@@ -4457,7 +4434,7 @@
               <a:pPr>
                 <a:defRPr/>
               </a:pPr>
-              <a:t>2020/9/25</a:t>
+              <a:t>2020/10/13</a:t>
             </a:fld>
             <a:endParaRPr lang="zh-CN" altLang="en-US"/>
           </a:p>
@@ -4598,10 +4575,9 @@
           <a:lstStyle/>
           <a:p>
             <a:r>
-              <a:rPr lang="zh-CN" altLang="en-US" smtClean="0"/>
+              <a:rPr lang="zh-CN" altLang="en-US"/>
               <a:t>单击此处编辑母版标题样式</a:t>
             </a:r>
-            <a:endParaRPr lang="zh-CN" altLang="en-US"/>
           </a:p>
         </p:txBody>
       </p:sp>
@@ -4630,38 +4606,37 @@
           <a:p>
             <a:pPr lvl="0"/>
             <a:r>
-              <a:rPr lang="zh-CN" altLang="en-US" smtClean="0"/>
+              <a:rPr lang="zh-CN" altLang="en-US"/>
               <a:t>单击此处编辑母版文本样式</a:t>
             </a:r>
           </a:p>
           <a:p>
             <a:pPr lvl="1"/>
             <a:r>
-              <a:rPr lang="zh-CN" altLang="en-US" smtClean="0"/>
+              <a:rPr lang="zh-CN" altLang="en-US"/>
               <a:t>第二级</a:t>
             </a:r>
           </a:p>
           <a:p>
             <a:pPr lvl="2"/>
             <a:r>
-              <a:rPr lang="zh-CN" altLang="en-US" smtClean="0"/>
+              <a:rPr lang="zh-CN" altLang="en-US"/>
               <a:t>第三级</a:t>
             </a:r>
           </a:p>
           <a:p>
             <a:pPr lvl="3"/>
             <a:r>
-              <a:rPr lang="zh-CN" altLang="en-US" smtClean="0"/>
+              <a:rPr lang="zh-CN" altLang="en-US"/>
               <a:t>第四级</a:t>
             </a:r>
           </a:p>
           <a:p>
             <a:pPr lvl="4"/>
             <a:r>
-              <a:rPr lang="zh-CN" altLang="en-US" smtClean="0"/>
+              <a:rPr lang="zh-CN" altLang="en-US"/>
               <a:t>第五级</a:t>
             </a:r>
-            <a:endParaRPr lang="zh-CN" altLang="en-US"/>
           </a:p>
         </p:txBody>
       </p:sp>
@@ -4703,7 +4678,7 @@
               <a:pPr>
                 <a:defRPr/>
               </a:pPr>
-              <a:t>2020/9/25</a:t>
+              <a:t>2020/10/13</a:t>
             </a:fld>
             <a:endParaRPr lang="zh-CN" altLang="en-US"/>
           </a:p>
@@ -4844,10 +4819,9 @@
           <a:lstStyle/>
           <a:p>
             <a:r>
-              <a:rPr lang="zh-CN" altLang="en-US" smtClean="0"/>
+              <a:rPr lang="zh-CN" altLang="en-US"/>
               <a:t>单击此处编辑母版标题样式</a:t>
             </a:r>
-            <a:endParaRPr lang="zh-CN" altLang="en-US"/>
           </a:p>
         </p:txBody>
       </p:sp>
@@ -4876,38 +4850,37 @@
           <a:p>
             <a:pPr lvl="0"/>
             <a:r>
-              <a:rPr lang="zh-CN" altLang="en-US" smtClean="0"/>
+              <a:rPr lang="zh-CN" altLang="en-US"/>
               <a:t>单击此处编辑母版文本样式</a:t>
             </a:r>
           </a:p>
           <a:p>
             <a:pPr lvl="1"/>
             <a:r>
-              <a:rPr lang="zh-CN" altLang="en-US" smtClean="0"/>
+              <a:rPr lang="zh-CN" altLang="en-US"/>
               <a:t>第二级</a:t>
             </a:r>
           </a:p>
           <a:p>
             <a:pPr lvl="2"/>
             <a:r>
-              <a:rPr lang="zh-CN" altLang="en-US" smtClean="0"/>
+              <a:rPr lang="zh-CN" altLang="en-US"/>
               <a:t>第三级</a:t>
             </a:r>
           </a:p>
           <a:p>
             <a:pPr lvl="3"/>
             <a:r>
-              <a:rPr lang="zh-CN" altLang="en-US" smtClean="0"/>
+              <a:rPr lang="zh-CN" altLang="en-US"/>
               <a:t>第四级</a:t>
             </a:r>
           </a:p>
           <a:p>
             <a:pPr lvl="4"/>
             <a:r>
-              <a:rPr lang="zh-CN" altLang="en-US" smtClean="0"/>
+              <a:rPr lang="zh-CN" altLang="en-US"/>
               <a:t>第五级</a:t>
             </a:r>
-            <a:endParaRPr lang="zh-CN" altLang="en-US"/>
           </a:p>
         </p:txBody>
       </p:sp>
@@ -4949,7 +4922,7 @@
               <a:pPr>
                 <a:defRPr/>
               </a:pPr>
-              <a:t>2020/9/25</a:t>
+              <a:t>2020/10/13</a:t>
             </a:fld>
             <a:endParaRPr lang="zh-CN" altLang="en-US"/>
           </a:p>
@@ -5094,10 +5067,9 @@
           </a:lstStyle>
           <a:p>
             <a:r>
-              <a:rPr lang="zh-CN" altLang="en-US" smtClean="0"/>
+              <a:rPr lang="zh-CN" altLang="en-US"/>
               <a:t>单击此处编辑母版标题样式</a:t>
             </a:r>
-            <a:endParaRPr lang="zh-CN" altLang="en-US"/>
           </a:p>
         </p:txBody>
       </p:sp>
@@ -5217,7 +5189,7 @@
           <a:p>
             <a:pPr lvl="0"/>
             <a:r>
-              <a:rPr lang="zh-CN" altLang="en-US" smtClean="0"/>
+              <a:rPr lang="zh-CN" altLang="en-US"/>
               <a:t>单击此处编辑母版文本样式</a:t>
             </a:r>
           </a:p>
@@ -5261,7 +5233,7 @@
               <a:pPr>
                 <a:defRPr/>
               </a:pPr>
-              <a:t>2020/9/25</a:t>
+              <a:t>2020/10/13</a:t>
             </a:fld>
             <a:endParaRPr lang="zh-CN" altLang="en-US"/>
           </a:p>
@@ -5402,10 +5374,9 @@
           <a:lstStyle/>
           <a:p>
             <a:r>
-              <a:rPr lang="zh-CN" altLang="en-US" smtClean="0"/>
+              <a:rPr lang="zh-CN" altLang="en-US"/>
               <a:t>单击此处编辑母版标题样式</a:t>
             </a:r>
-            <a:endParaRPr lang="zh-CN" altLang="en-US"/>
           </a:p>
         </p:txBody>
       </p:sp>
@@ -5462,38 +5433,37 @@
           <a:p>
             <a:pPr lvl="0"/>
             <a:r>
-              <a:rPr lang="zh-CN" altLang="en-US" smtClean="0"/>
+              <a:rPr lang="zh-CN" altLang="en-US"/>
               <a:t>单击此处编辑母版文本样式</a:t>
             </a:r>
           </a:p>
           <a:p>
             <a:pPr lvl="1"/>
             <a:r>
-              <a:rPr lang="zh-CN" altLang="en-US" smtClean="0"/>
+              <a:rPr lang="zh-CN" altLang="en-US"/>
               <a:t>第二级</a:t>
             </a:r>
           </a:p>
           <a:p>
             <a:pPr lvl="2"/>
             <a:r>
-              <a:rPr lang="zh-CN" altLang="en-US" smtClean="0"/>
+              <a:rPr lang="zh-CN" altLang="en-US"/>
               <a:t>第三级</a:t>
             </a:r>
           </a:p>
           <a:p>
             <a:pPr lvl="3"/>
             <a:r>
-              <a:rPr lang="zh-CN" altLang="en-US" smtClean="0"/>
+              <a:rPr lang="zh-CN" altLang="en-US"/>
               <a:t>第四级</a:t>
             </a:r>
           </a:p>
           <a:p>
             <a:pPr lvl="4"/>
             <a:r>
-              <a:rPr lang="zh-CN" altLang="en-US" smtClean="0"/>
+              <a:rPr lang="zh-CN" altLang="en-US"/>
               <a:t>第五级</a:t>
             </a:r>
-            <a:endParaRPr lang="zh-CN" altLang="en-US"/>
           </a:p>
         </p:txBody>
       </p:sp>
@@ -5550,38 +5520,37 @@
           <a:p>
             <a:pPr lvl="0"/>
             <a:r>
-              <a:rPr lang="zh-CN" altLang="en-US" smtClean="0"/>
+              <a:rPr lang="zh-CN" altLang="en-US"/>
               <a:t>单击此处编辑母版文本样式</a:t>
             </a:r>
           </a:p>
           <a:p>
             <a:pPr lvl="1"/>
             <a:r>
-              <a:rPr lang="zh-CN" altLang="en-US" smtClean="0"/>
+              <a:rPr lang="zh-CN" altLang="en-US"/>
               <a:t>第二级</a:t>
             </a:r>
           </a:p>
           <a:p>
             <a:pPr lvl="2"/>
             <a:r>
-              <a:rPr lang="zh-CN" altLang="en-US" smtClean="0"/>
+              <a:rPr lang="zh-CN" altLang="en-US"/>
               <a:t>第三级</a:t>
             </a:r>
           </a:p>
           <a:p>
             <a:pPr lvl="3"/>
             <a:r>
-              <a:rPr lang="zh-CN" altLang="en-US" smtClean="0"/>
+              <a:rPr lang="zh-CN" altLang="en-US"/>
               <a:t>第四级</a:t>
             </a:r>
           </a:p>
           <a:p>
             <a:pPr lvl="4"/>
             <a:r>
-              <a:rPr lang="zh-CN" altLang="en-US" smtClean="0"/>
+              <a:rPr lang="zh-CN" altLang="en-US"/>
               <a:t>第五级</a:t>
             </a:r>
-            <a:endParaRPr lang="zh-CN" altLang="en-US"/>
           </a:p>
         </p:txBody>
       </p:sp>
@@ -5623,7 +5592,7 @@
               <a:pPr>
                 <a:defRPr/>
               </a:pPr>
-              <a:t>2020/9/25</a:t>
+              <a:t>2020/10/13</a:t>
             </a:fld>
             <a:endParaRPr lang="zh-CN" altLang="en-US"/>
           </a:p>
@@ -5768,10 +5737,9 @@
           </a:lstStyle>
           <a:p>
             <a:r>
-              <a:rPr lang="zh-CN" altLang="en-US" smtClean="0"/>
+              <a:rPr lang="zh-CN" altLang="en-US"/>
               <a:t>单击此处编辑母版标题样式</a:t>
             </a:r>
-            <a:endParaRPr lang="zh-CN" altLang="en-US"/>
           </a:p>
         </p:txBody>
       </p:sp>
@@ -5837,7 +5805,7 @@
           <a:p>
             <a:pPr lvl="0"/>
             <a:r>
-              <a:rPr lang="zh-CN" altLang="en-US" smtClean="0"/>
+              <a:rPr lang="zh-CN" altLang="en-US"/>
               <a:t>单击此处编辑母版文本样式</a:t>
             </a:r>
           </a:p>
@@ -5896,38 +5864,37 @@
           <a:p>
             <a:pPr lvl="0"/>
             <a:r>
-              <a:rPr lang="zh-CN" altLang="en-US" smtClean="0"/>
+              <a:rPr lang="zh-CN" altLang="en-US"/>
               <a:t>单击此处编辑母版文本样式</a:t>
             </a:r>
           </a:p>
           <a:p>
             <a:pPr lvl="1"/>
             <a:r>
-              <a:rPr lang="zh-CN" altLang="en-US" smtClean="0"/>
+              <a:rPr lang="zh-CN" altLang="en-US"/>
               <a:t>第二级</a:t>
             </a:r>
           </a:p>
           <a:p>
             <a:pPr lvl="2"/>
             <a:r>
-              <a:rPr lang="zh-CN" altLang="en-US" smtClean="0"/>
+              <a:rPr lang="zh-CN" altLang="en-US"/>
               <a:t>第三级</a:t>
             </a:r>
           </a:p>
           <a:p>
             <a:pPr lvl="3"/>
             <a:r>
-              <a:rPr lang="zh-CN" altLang="en-US" smtClean="0"/>
+              <a:rPr lang="zh-CN" altLang="en-US"/>
               <a:t>第四级</a:t>
             </a:r>
           </a:p>
           <a:p>
             <a:pPr lvl="4"/>
             <a:r>
-              <a:rPr lang="zh-CN" altLang="en-US" smtClean="0"/>
+              <a:rPr lang="zh-CN" altLang="en-US"/>
               <a:t>第五级</a:t>
             </a:r>
-            <a:endParaRPr lang="zh-CN" altLang="en-US"/>
           </a:p>
         </p:txBody>
       </p:sp>
@@ -5993,7 +5960,7 @@
           <a:p>
             <a:pPr lvl="0"/>
             <a:r>
-              <a:rPr lang="zh-CN" altLang="en-US" smtClean="0"/>
+              <a:rPr lang="zh-CN" altLang="en-US"/>
               <a:t>单击此处编辑母版文本样式</a:t>
             </a:r>
           </a:p>
@@ -6052,38 +6019,37 @@
           <a:p>
             <a:pPr lvl="0"/>
             <a:r>
-              <a:rPr lang="zh-CN" altLang="en-US" smtClean="0"/>
+              <a:rPr lang="zh-CN" altLang="en-US"/>
               <a:t>单击此处编辑母版文本样式</a:t>
             </a:r>
           </a:p>
           <a:p>
             <a:pPr lvl="1"/>
             <a:r>
-              <a:rPr lang="zh-CN" altLang="en-US" smtClean="0"/>
+              <a:rPr lang="zh-CN" altLang="en-US"/>
               <a:t>第二级</a:t>
             </a:r>
           </a:p>
           <a:p>
             <a:pPr lvl="2"/>
             <a:r>
-              <a:rPr lang="zh-CN" altLang="en-US" smtClean="0"/>
+              <a:rPr lang="zh-CN" altLang="en-US"/>
               <a:t>第三级</a:t>
             </a:r>
           </a:p>
           <a:p>
             <a:pPr lvl="3"/>
             <a:r>
-              <a:rPr lang="zh-CN" altLang="en-US" smtClean="0"/>
+              <a:rPr lang="zh-CN" altLang="en-US"/>
               <a:t>第四级</a:t>
             </a:r>
           </a:p>
           <a:p>
             <a:pPr lvl="4"/>
             <a:r>
-              <a:rPr lang="zh-CN" altLang="en-US" smtClean="0"/>
+              <a:rPr lang="zh-CN" altLang="en-US"/>
               <a:t>第五级</a:t>
             </a:r>
-            <a:endParaRPr lang="zh-CN" altLang="en-US"/>
           </a:p>
         </p:txBody>
       </p:sp>
@@ -6125,7 +6091,7 @@
               <a:pPr>
                 <a:defRPr/>
               </a:pPr>
-              <a:t>2020/9/25</a:t>
+              <a:t>2020/10/13</a:t>
             </a:fld>
             <a:endParaRPr lang="zh-CN" altLang="en-US"/>
           </a:p>
@@ -6266,10 +6232,9 @@
           <a:lstStyle/>
           <a:p>
             <a:r>
-              <a:rPr lang="zh-CN" altLang="en-US" smtClean="0"/>
+              <a:rPr lang="zh-CN" altLang="en-US"/>
               <a:t>单击此处编辑母版标题样式</a:t>
             </a:r>
-            <a:endParaRPr lang="zh-CN" altLang="en-US"/>
           </a:p>
         </p:txBody>
       </p:sp>
@@ -6311,7 +6276,7 @@
               <a:pPr>
                 <a:defRPr/>
               </a:pPr>
-              <a:t>2020/9/25</a:t>
+              <a:t>2020/10/13</a:t>
             </a:fld>
             <a:endParaRPr lang="zh-CN" altLang="en-US"/>
           </a:p>
@@ -6466,7 +6431,7 @@
               <a:pPr>
                 <a:defRPr/>
               </a:pPr>
-              <a:t>2020/9/25</a:t>
+              <a:t>2020/10/13</a:t>
             </a:fld>
             <a:endParaRPr lang="zh-CN" altLang="en-US"/>
           </a:p>
@@ -6563,13 +6528,6 @@
   <p:clrMapOvr>
     <a:masterClrMapping/>
   </p:clrMapOvr>
-  <p:timing>
-    <p:tnLst>
-      <p:par>
-        <p:cTn id="1" dur="indefinite" restart="never" nodeType="tmRoot"/>
-      </p:par>
-    </p:tnLst>
-  </p:timing>
 </p:sldLayout>
 </file>
 
@@ -6618,10 +6576,9 @@
           </a:lstStyle>
           <a:p>
             <a:r>
-              <a:rPr lang="zh-CN" altLang="en-US" smtClean="0"/>
+              <a:rPr lang="zh-CN" altLang="en-US"/>
               <a:t>单击此处编辑母版标题样式</a:t>
             </a:r>
-            <a:endParaRPr lang="zh-CN" altLang="en-US"/>
           </a:p>
         </p:txBody>
       </p:sp>
@@ -6678,38 +6635,37 @@
           <a:p>
             <a:pPr lvl="0"/>
             <a:r>
-              <a:rPr lang="zh-CN" altLang="en-US" smtClean="0"/>
+              <a:rPr lang="zh-CN" altLang="en-US"/>
               <a:t>单击此处编辑母版文本样式</a:t>
             </a:r>
           </a:p>
           <a:p>
             <a:pPr lvl="1"/>
             <a:r>
-              <a:rPr lang="zh-CN" altLang="en-US" smtClean="0"/>
+              <a:rPr lang="zh-CN" altLang="en-US"/>
               <a:t>第二级</a:t>
             </a:r>
           </a:p>
           <a:p>
             <a:pPr lvl="2"/>
             <a:r>
-              <a:rPr lang="zh-CN" altLang="en-US" smtClean="0"/>
+              <a:rPr lang="zh-CN" altLang="en-US"/>
               <a:t>第三级</a:t>
             </a:r>
           </a:p>
           <a:p>
             <a:pPr lvl="3"/>
             <a:r>
-              <a:rPr lang="zh-CN" altLang="en-US" smtClean="0"/>
+              <a:rPr lang="zh-CN" altLang="en-US"/>
               <a:t>第四级</a:t>
             </a:r>
           </a:p>
           <a:p>
             <a:pPr lvl="4"/>
             <a:r>
-              <a:rPr lang="zh-CN" altLang="en-US" smtClean="0"/>
+              <a:rPr lang="zh-CN" altLang="en-US"/>
               <a:t>第五级</a:t>
             </a:r>
-            <a:endParaRPr lang="zh-CN" altLang="en-US"/>
           </a:p>
         </p:txBody>
       </p:sp>
@@ -6775,7 +6731,7 @@
           <a:p>
             <a:pPr lvl="0"/>
             <a:r>
-              <a:rPr lang="zh-CN" altLang="en-US" smtClean="0"/>
+              <a:rPr lang="zh-CN" altLang="en-US"/>
               <a:t>单击此处编辑母版文本样式</a:t>
             </a:r>
           </a:p>
@@ -6819,7 +6775,7 @@
               <a:pPr>
                 <a:defRPr/>
               </a:pPr>
-              <a:t>2020/9/25</a:t>
+              <a:t>2020/10/13</a:t>
             </a:fld>
             <a:endParaRPr lang="zh-CN" altLang="en-US"/>
           </a:p>
@@ -6964,10 +6920,9 @@
           </a:lstStyle>
           <a:p>
             <a:r>
-              <a:rPr lang="zh-CN" altLang="en-US" smtClean="0"/>
+              <a:rPr lang="zh-CN" altLang="en-US"/>
               <a:t>单击此处编辑母版标题样式</a:t>
             </a:r>
-            <a:endParaRPr lang="zh-CN" altLang="en-US"/>
           </a:p>
         </p:txBody>
       </p:sp>
@@ -7032,7 +6987,7 @@
           </a:lstStyle>
           <a:p>
             <a:pPr lvl="0"/>
-            <a:endParaRPr lang="zh-CN" altLang="en-US" noProof="0" smtClean="0"/>
+            <a:endParaRPr lang="zh-CN" altLang="en-US" noProof="0"/>
           </a:p>
         </p:txBody>
       </p:sp>
@@ -7098,7 +7053,7 @@
           <a:p>
             <a:pPr lvl="0"/>
             <a:r>
-              <a:rPr lang="zh-CN" altLang="en-US" smtClean="0"/>
+              <a:rPr lang="zh-CN" altLang="en-US"/>
               <a:t>单击此处编辑母版文本样式</a:t>
             </a:r>
           </a:p>
@@ -7142,7 +7097,7 @@
               <a:pPr>
                 <a:defRPr/>
               </a:pPr>
-              <a:t>2020/9/25</a:t>
+              <a:t>2020/10/13</a:t>
             </a:fld>
             <a:endParaRPr lang="zh-CN" altLang="en-US"/>
           </a:p>
@@ -7289,13 +7244,6 @@
     <p:sldLayoutId id="2147485142" r:id="rId10"/>
     <p:sldLayoutId id="2147485143" r:id="rId11"/>
   </p:sldLayoutIdLst>
-  <p:timing>
-    <p:tnLst>
-      <p:par>
-        <p:cTn id="1" dur="indefinite" restart="never" nodeType="tmRoot"/>
-      </p:par>
-    </p:tnLst>
-  </p:timing>
   <p:txStyles>
     <p:titleStyle>
       <a:lvl1pPr algn="ctr" rtl="0" eaLnBrk="0" fontAlgn="base" hangingPunct="0">
@@ -7733,13 +7681,6 @@
     <p:sldLayoutId id="2147485153" r:id="rId10"/>
     <p:sldLayoutId id="2147485154" r:id="rId11"/>
   </p:sldLayoutIdLst>
-  <p:timing>
-    <p:tnLst>
-      <p:par>
-        <p:cTn id="1" dur="indefinite" restart="never" nodeType="tmRoot"/>
-      </p:par>
-    </p:tnLst>
-  </p:timing>
   <p:txStyles>
     <p:titleStyle>
       <a:lvl1pPr algn="ctr" rtl="0" eaLnBrk="0" fontAlgn="base" hangingPunct="0">
@@ -8306,25 +8247,18 @@
           </a:lstStyle>
           <a:p>
             <a:r>
-              <a:rPr lang="en-US" altLang="zh-CN" b="1" dirty="0" smtClean="0">
+              <a:rPr lang="en-US" altLang="zh-CN" b="1" dirty="0">
                 <a:latin typeface="Adobe 黑体 Std R" panose="020B0400000000000000" pitchFamily="34" charset="-122"/>
                 <a:ea typeface="Adobe 黑体 Std R" panose="020B0400000000000000" pitchFamily="34" charset="-122"/>
               </a:rPr>
               <a:t>Ch.3 </a:t>
             </a:r>
             <a:r>
-              <a:rPr lang="zh-CN" altLang="en-US" b="1" dirty="0" smtClean="0">
-                <a:latin typeface="Adobe 黑体 Std R" panose="020B0400000000000000" pitchFamily="34" charset="-122"/>
-                <a:ea typeface="Adobe 黑体 Std R" panose="020B0400000000000000" pitchFamily="34" charset="-122"/>
-              </a:rPr>
-              <a:t>运算</a:t>
-            </a:r>
-            <a:r>
               <a:rPr lang="zh-CN" altLang="en-US" b="1" dirty="0">
                 <a:latin typeface="Adobe 黑体 Std R" panose="020B0400000000000000" pitchFamily="34" charset="-122"/>
                 <a:ea typeface="Adobe 黑体 Std R" panose="020B0400000000000000" pitchFamily="34" charset="-122"/>
               </a:rPr>
-              <a:t>、存储</a:t>
+              <a:t>运算、存储</a:t>
             </a:r>
             <a:endParaRPr lang="en-US" altLang="zh-CN" b="1" dirty="0">
               <a:latin typeface="Adobe 黑体 Std R" panose="020B0400000000000000" pitchFamily="34" charset="-122"/>
@@ -8332,15 +8266,8 @@
             </a:endParaRPr>
           </a:p>
           <a:p>
-            <a:r>
-              <a:rPr lang="zh-CN" altLang="en-US" dirty="0" smtClean="0">
-                <a:latin typeface="Adobe 黑体 Std R" panose="020B0400000000000000" pitchFamily="34" charset="-122"/>
-                <a:ea typeface="Adobe 黑体 Std R" panose="020B0400000000000000" pitchFamily="34" charset="-122"/>
-              </a:rPr>
-              <a:t/>
-            </a:r>
             <a:br>
-              <a:rPr lang="zh-CN" altLang="en-US" dirty="0" smtClean="0">
+              <a:rPr lang="zh-CN" altLang="en-US" dirty="0">
                 <a:latin typeface="Adobe 黑体 Std R" panose="020B0400000000000000" pitchFamily="34" charset="-122"/>
                 <a:ea typeface="Adobe 黑体 Std R" panose="020B0400000000000000" pitchFamily="34" charset="-122"/>
               </a:rPr>
@@ -8373,25 +8300,11 @@
           <a:p>
             <a:pPr algn="ctr"/>
             <a:r>
-              <a:rPr lang="en-US" altLang="zh-CN" sz="2400" b="1" dirty="0" smtClean="0">
-                <a:latin typeface="Adobe 黑体 Std R" panose="020B0400000000000000" pitchFamily="34" charset="-122"/>
-                <a:ea typeface="Adobe 黑体 Std R" panose="020B0400000000000000" pitchFamily="34" charset="-122"/>
-              </a:rPr>
-              <a:t>2020 </a:t>
-            </a:r>
-            <a:r>
               <a:rPr lang="en-US" altLang="zh-CN" sz="2400" b="1" dirty="0">
                 <a:latin typeface="Adobe 黑体 Std R" panose="020B0400000000000000" pitchFamily="34" charset="-122"/>
                 <a:ea typeface="Adobe 黑体 Std R" panose="020B0400000000000000" pitchFamily="34" charset="-122"/>
               </a:rPr>
-              <a:t>/ </a:t>
-            </a:r>
-            <a:r>
-              <a:rPr lang="en-US" altLang="zh-CN" sz="2400" b="1" dirty="0" smtClean="0">
-                <a:latin typeface="Adobe 黑体 Std R" panose="020B0400000000000000" pitchFamily="34" charset="-122"/>
-                <a:ea typeface="Adobe 黑体 Std R" panose="020B0400000000000000" pitchFamily="34" charset="-122"/>
-              </a:rPr>
-              <a:t>09</a:t>
+              <a:t>2020/10/16</a:t>
             </a:r>
             <a:endParaRPr lang="en-US" altLang="zh-CN" sz="2400" b="1" dirty="0">
               <a:ln w="12700">
@@ -8432,13 +8345,6 @@
       <p:transition/>
     </mc:Fallback>
   </mc:AlternateContent>
-  <p:timing>
-    <p:tnLst>
-      <p:par>
-        <p:cTn id="1" dur="indefinite" restart="never" nodeType="tmRoot"/>
-      </p:par>
-    </p:tnLst>
-  </p:timing>
 </p:sld>
 </file>
 
@@ -8475,7 +8381,7 @@
           <a:lstStyle/>
           <a:p>
             <a:r>
-              <a:rPr lang="en-US" altLang="zh-CN" dirty="0" smtClean="0"/>
+              <a:rPr lang="en-US" altLang="zh-CN" dirty="0"/>
               <a:t>Cache</a:t>
             </a:r>
             <a:endParaRPr lang="zh-CN" altLang="en-US" dirty="0"/>
@@ -8498,14 +8404,13 @@
           <a:lstStyle/>
           <a:p>
             <a:r>
-              <a:rPr lang="en-US" altLang="zh-CN" dirty="0" smtClean="0"/>
+              <a:rPr lang="en-US" altLang="zh-CN" dirty="0"/>
               <a:t>Cache</a:t>
             </a:r>
             <a:r>
-              <a:rPr lang="zh-CN" altLang="en-US" dirty="0" smtClean="0"/>
+              <a:rPr lang="zh-CN" altLang="en-US" dirty="0"/>
               <a:t>命中</a:t>
             </a:r>
-            <a:endParaRPr lang="zh-CN" altLang="en-US" dirty="0"/>
           </a:p>
         </p:txBody>
       </p:sp>
@@ -8555,14 +8460,13 @@
           <a:lstStyle/>
           <a:p>
             <a:r>
-              <a:rPr lang="en-US" altLang="zh-CN" dirty="0" smtClean="0"/>
+              <a:rPr lang="en-US" altLang="zh-CN" dirty="0"/>
               <a:t>cache</a:t>
             </a:r>
             <a:r>
-              <a:rPr lang="zh-CN" altLang="en-US" dirty="0" smtClean="0"/>
+              <a:rPr lang="zh-CN" altLang="en-US" dirty="0"/>
               <a:t>示意</a:t>
             </a:r>
-            <a:endParaRPr lang="zh-CN" altLang="en-US" dirty="0"/>
           </a:p>
         </p:txBody>
       </p:sp>
@@ -8726,10 +8630,9 @@
             <a:p>
               <a:pPr algn="ctr"/>
               <a:r>
-                <a:rPr lang="en-US" altLang="zh-CN" dirty="0" smtClean="0"/>
+                <a:rPr lang="en-US" altLang="zh-CN" dirty="0"/>
                 <a:t>363</a:t>
               </a:r>
-              <a:endParaRPr lang="en-US" altLang="zh-CN" dirty="0"/>
             </a:p>
           </p:txBody>
         </p:sp>
@@ -8755,7 +8658,6 @@
             <a:headEnd/>
             <a:tailEnd/>
           </a:ln>
-          <a:extLst/>
         </p:spPr>
         <p:style>
           <a:lnRef idx="2">
@@ -8854,10 +8756,9 @@
               <a:p>
                 <a:pPr algn="ctr"/>
                 <a:r>
-                  <a:rPr lang="en-US" altLang="zh-CN" sz="1400" dirty="0" smtClean="0"/>
+                  <a:rPr lang="en-US" altLang="zh-CN" sz="1400" dirty="0"/>
                   <a:t>231</a:t>
                 </a:r>
-                <a:endParaRPr lang="en-US" altLang="zh-CN" sz="1400" dirty="0"/>
               </a:p>
             </p:txBody>
           </p:sp>
@@ -8956,10 +8857,9 @@
               <a:p>
                 <a:pPr algn="ctr"/>
                 <a:r>
-                  <a:rPr lang="en-US" altLang="zh-CN" sz="1400" dirty="0" smtClean="0"/>
+                  <a:rPr lang="en-US" altLang="zh-CN" sz="1400" dirty="0"/>
                   <a:t>363</a:t>
                 </a:r>
-                <a:endParaRPr lang="en-US" altLang="zh-CN" sz="1400" dirty="0"/>
               </a:p>
             </p:txBody>
           </p:sp>
@@ -9220,10 +9120,9 @@
               <a:p>
                 <a:pPr algn="ctr"/>
                 <a:r>
-                  <a:rPr lang="en-US" altLang="zh-CN" sz="1400" dirty="0" smtClean="0"/>
+                  <a:rPr lang="en-US" altLang="zh-CN" sz="1400" dirty="0"/>
                   <a:t>75</a:t>
                 </a:r>
-                <a:endParaRPr lang="en-US" altLang="zh-CN" sz="1400" dirty="0"/>
               </a:p>
             </p:txBody>
           </p:sp>
@@ -9528,10 +9427,9 @@
                 <a:p>
                   <a:pPr algn="ctr"/>
                   <a:r>
-                    <a:rPr lang="en-US" altLang="zh-CN" dirty="0" smtClean="0"/>
+                    <a:rPr lang="en-US" altLang="zh-CN" dirty="0"/>
                     <a:t>mat</a:t>
                   </a:r>
-                  <a:endParaRPr lang="en-US" altLang="zh-CN" dirty="0"/>
                 </a:p>
               </p:txBody>
             </p:sp>
@@ -9581,10 +9479,9 @@
                 <a:p>
                   <a:pPr algn="ctr"/>
                   <a:r>
-                    <a:rPr lang="en-US" altLang="zh-CN" dirty="0" smtClean="0"/>
+                    <a:rPr lang="en-US" altLang="zh-CN" dirty="0"/>
                     <a:t>231</a:t>
                   </a:r>
-                  <a:endParaRPr lang="en-US" altLang="zh-CN" dirty="0"/>
                 </a:p>
               </p:txBody>
             </p:sp>
@@ -10078,10 +9975,9 @@
                 <a:p>
                   <a:pPr algn="ctr"/>
                   <a:r>
-                    <a:rPr lang="en-US" altLang="zh-CN" dirty="0" smtClean="0"/>
+                    <a:rPr lang="en-US" altLang="zh-CN" dirty="0"/>
                     <a:t>75</a:t>
                   </a:r>
-                  <a:endParaRPr lang="en-US" altLang="zh-CN" dirty="0"/>
                 </a:p>
               </p:txBody>
             </p:sp>
@@ -11509,7 +11405,7 @@
           <a:lstStyle/>
           <a:p>
             <a:r>
-              <a:rPr lang="en-US" altLang="zh-CN" b="1" dirty="0" smtClean="0">
+              <a:rPr lang="en-US" altLang="zh-CN" b="1" dirty="0">
                 <a:solidFill>
                   <a:srgbClr val="FF0000"/>
                 </a:solidFill>
@@ -11547,7 +11443,7 @@
           <a:lstStyle/>
           <a:p>
             <a:r>
-              <a:rPr lang="en-US" altLang="zh-CN" b="1" dirty="0" smtClean="0">
+              <a:rPr lang="en-US" altLang="zh-CN" b="1" dirty="0">
                 <a:solidFill>
                   <a:srgbClr val="FF0000"/>
                 </a:solidFill>
@@ -11683,14 +11579,13 @@
           <a:lstStyle/>
           <a:p>
             <a:r>
-              <a:rPr lang="en-US" altLang="zh-CN" dirty="0" smtClean="0"/>
+              <a:rPr lang="en-US" altLang="zh-CN" dirty="0"/>
               <a:t>cache</a:t>
             </a:r>
             <a:r>
-              <a:rPr lang="zh-CN" altLang="en-US" dirty="0" smtClean="0"/>
+              <a:rPr lang="zh-CN" altLang="en-US" dirty="0"/>
               <a:t>示意</a:t>
             </a:r>
-            <a:endParaRPr lang="zh-CN" altLang="en-US" dirty="0"/>
           </a:p>
         </p:txBody>
       </p:sp>
@@ -11854,10 +11749,9 @@
             <a:p>
               <a:pPr algn="ctr"/>
               <a:r>
-                <a:rPr lang="en-US" altLang="zh-CN" dirty="0" smtClean="0"/>
+                <a:rPr lang="en-US" altLang="zh-CN" dirty="0"/>
                 <a:t>14</a:t>
               </a:r>
-              <a:endParaRPr lang="en-US" altLang="zh-CN" dirty="0"/>
             </a:p>
           </p:txBody>
         </p:sp>
@@ -11883,7 +11777,6 @@
             <a:headEnd/>
             <a:tailEnd/>
           </a:ln>
-          <a:extLst/>
         </p:spPr>
         <p:style>
           <a:lnRef idx="2">
@@ -12644,10 +12537,9 @@
                 <a:p>
                   <a:pPr algn="ctr"/>
                   <a:r>
-                    <a:rPr lang="en-US" altLang="zh-CN" dirty="0" smtClean="0"/>
+                    <a:rPr lang="en-US" altLang="zh-CN" dirty="0"/>
                     <a:t>mat</a:t>
                   </a:r>
-                  <a:endParaRPr lang="en-US" altLang="zh-CN" dirty="0"/>
                 </a:p>
               </p:txBody>
             </p:sp>
@@ -13599,10 +13491,9 @@
                 <a:p>
                   <a:pPr algn="ctr"/>
                   <a:r>
-                    <a:rPr lang="en-US" altLang="zh-CN" dirty="0" smtClean="0"/>
+                    <a:rPr lang="en-US" altLang="zh-CN" dirty="0"/>
                     <a:t>14</a:t>
                   </a:r>
-                  <a:endParaRPr lang="en-US" altLang="zh-CN" dirty="0"/>
                 </a:p>
               </p:txBody>
             </p:sp>
@@ -14618,7 +14509,7 @@
           <a:lstStyle/>
           <a:p>
             <a:r>
-              <a:rPr lang="en-US" altLang="zh-CN" b="1" dirty="0" smtClean="0">
+              <a:rPr lang="en-US" altLang="zh-CN" b="1" dirty="0">
                 <a:solidFill>
                   <a:srgbClr val="FF0000"/>
                 </a:solidFill>
@@ -14656,7 +14547,7 @@
           <a:lstStyle/>
           <a:p>
             <a:r>
-              <a:rPr lang="en-US" altLang="zh-CN" b="1" dirty="0" smtClean="0">
+              <a:rPr lang="en-US" altLang="zh-CN" b="1" dirty="0">
                 <a:solidFill>
                   <a:srgbClr val="FF0000"/>
                 </a:solidFill>
@@ -15042,10 +14933,9 @@
                 <a:p>
                   <a:pPr algn="ctr"/>
                   <a:r>
-                    <a:rPr lang="en-US" altLang="zh-CN" dirty="0" smtClean="0"/>
+                    <a:rPr lang="en-US" altLang="zh-CN" dirty="0"/>
                     <a:t>mat</a:t>
                   </a:r>
-                  <a:endParaRPr lang="en-US" altLang="zh-CN" dirty="0"/>
                 </a:p>
               </p:txBody>
             </p:sp>
@@ -16018,10 +15908,9 @@
                 <a:p>
                   <a:pPr algn="ctr"/>
                   <a:r>
-                    <a:rPr lang="en-US" altLang="zh-CN" dirty="0" smtClean="0"/>
+                    <a:rPr lang="en-US" altLang="zh-CN" dirty="0"/>
                     <a:t>14</a:t>
                   </a:r>
-                  <a:endParaRPr lang="en-US" altLang="zh-CN" dirty="0"/>
                 </a:p>
               </p:txBody>
             </p:sp>
@@ -16123,10 +16012,9 @@
                 <a:p>
                   <a:pPr algn="ctr"/>
                   <a:r>
-                    <a:rPr lang="en-US" altLang="zh-CN" dirty="0" smtClean="0"/>
+                    <a:rPr lang="en-US" altLang="zh-CN" dirty="0"/>
                     <a:t>17</a:t>
                   </a:r>
-                  <a:endParaRPr lang="en-US" altLang="zh-CN" dirty="0"/>
                 </a:p>
               </p:txBody>
             </p:sp>
@@ -16420,10 +16308,9 @@
                 <a:p>
                   <a:pPr algn="ctr"/>
                   <a:r>
-                    <a:rPr lang="en-US" altLang="zh-CN" dirty="0" smtClean="0"/>
+                    <a:rPr lang="en-US" altLang="zh-CN" dirty="0"/>
                     <a:t>29</a:t>
                   </a:r>
-                  <a:endParaRPr lang="en-US" altLang="zh-CN" dirty="0"/>
                 </a:p>
               </p:txBody>
             </p:sp>
@@ -17017,14 +16904,13 @@
           <a:lstStyle/>
           <a:p>
             <a:r>
-              <a:rPr lang="en-US" altLang="zh-CN" dirty="0" smtClean="0"/>
+              <a:rPr lang="en-US" altLang="zh-CN" dirty="0"/>
               <a:t>cache</a:t>
             </a:r>
             <a:r>
-              <a:rPr lang="zh-CN" altLang="en-US" dirty="0" smtClean="0"/>
+              <a:rPr lang="zh-CN" altLang="en-US" dirty="0"/>
               <a:t>示意</a:t>
             </a:r>
-            <a:endParaRPr lang="zh-CN" altLang="en-US" dirty="0"/>
           </a:p>
         </p:txBody>
       </p:sp>
@@ -17188,10 +17074,9 @@
             <a:p>
               <a:pPr algn="ctr"/>
               <a:r>
-                <a:rPr lang="en-US" altLang="zh-CN" dirty="0" smtClean="0"/>
+                <a:rPr lang="en-US" altLang="zh-CN" dirty="0"/>
                 <a:t>14</a:t>
               </a:r>
-              <a:endParaRPr lang="en-US" altLang="zh-CN" dirty="0"/>
             </a:p>
           </p:txBody>
         </p:sp>
@@ -17217,7 +17102,6 @@
             <a:headEnd/>
             <a:tailEnd/>
           </a:ln>
-          <a:extLst/>
         </p:spPr>
         <p:style>
           <a:lnRef idx="2">
@@ -17414,10 +17298,9 @@
               <a:p>
                 <a:pPr algn="ctr"/>
                 <a:r>
-                  <a:rPr lang="en-US" altLang="zh-CN" dirty="0" smtClean="0"/>
+                  <a:rPr lang="en-US" altLang="zh-CN" dirty="0"/>
                   <a:t>14</a:t>
                 </a:r>
-                <a:endParaRPr lang="en-US" altLang="zh-CN" dirty="0"/>
               </a:p>
             </p:txBody>
           </p:sp>
@@ -17678,10 +17561,9 @@
               <a:p>
                 <a:pPr algn="ctr"/>
                 <a:r>
-                  <a:rPr lang="en-US" altLang="zh-CN" dirty="0" smtClean="0"/>
+                  <a:rPr lang="en-US" altLang="zh-CN" dirty="0"/>
                   <a:t>29</a:t>
                 </a:r>
-                <a:endParaRPr lang="en-US" altLang="zh-CN" dirty="0"/>
               </a:p>
             </p:txBody>
           </p:sp>
@@ -17710,7 +17592,7 @@
           <a:lstStyle/>
           <a:p>
             <a:r>
-              <a:rPr lang="en-US" altLang="zh-CN" b="1" dirty="0" smtClean="0">
+              <a:rPr lang="en-US" altLang="zh-CN" b="1" dirty="0">
                 <a:solidFill>
                   <a:srgbClr val="FF0000"/>
                 </a:solidFill>
@@ -17748,7 +17630,7 @@
           <a:lstStyle/>
           <a:p>
             <a:r>
-              <a:rPr lang="en-US" altLang="zh-CN" b="1" dirty="0" smtClean="0">
+              <a:rPr lang="en-US" altLang="zh-CN" b="1" dirty="0">
                 <a:solidFill>
                   <a:srgbClr val="FF0000"/>
                 </a:solidFill>
@@ -17856,7 +17738,7 @@
               <a:buNone/>
             </a:pPr>
             <a:r>
-              <a:rPr lang="en-US" altLang="zh-CN" sz="5400" dirty="0" smtClean="0"/>
+              <a:rPr lang="en-US" altLang="zh-CN" sz="5400" dirty="0"/>
               <a:t>Q &amp; A</a:t>
             </a:r>
             <a:endParaRPr lang="zh-CN" altLang="en-US" sz="5400" dirty="0"/>
@@ -17873,13 +17755,6 @@
   <p:clrMapOvr>
     <a:masterClrMapping/>
   </p:clrMapOvr>
-  <p:timing>
-    <p:tnLst>
-      <p:par>
-        <p:cTn id="1" dur="indefinite" restart="never" nodeType="tmRoot"/>
-      </p:par>
-    </p:tnLst>
-  </p:timing>
 </p:sld>
 </file>
 
@@ -17916,10 +17791,9 @@
           <a:lstStyle/>
           <a:p>
             <a:r>
-              <a:rPr lang="zh-CN" altLang="en-US" dirty="0" smtClean="0"/>
+              <a:rPr lang="zh-CN" altLang="en-US" dirty="0"/>
               <a:t>都有哪些存储设备</a:t>
             </a:r>
-            <a:endParaRPr lang="zh-CN" altLang="en-US" dirty="0"/>
           </a:p>
         </p:txBody>
       </p:sp>
@@ -17939,54 +17813,54 @@
           <a:lstStyle/>
           <a:p>
             <a:r>
-              <a:rPr lang="en-US" altLang="zh-CN" dirty="0" smtClean="0"/>
+              <a:rPr lang="en-US" altLang="zh-CN" dirty="0"/>
               <a:t>CPU</a:t>
             </a:r>
             <a:r>
-              <a:rPr lang="zh-CN" altLang="en-US" dirty="0" smtClean="0"/>
+              <a:rPr lang="zh-CN" altLang="en-US" dirty="0"/>
               <a:t>寄存器</a:t>
             </a:r>
-            <a:endParaRPr lang="en-US" altLang="zh-CN" dirty="0" smtClean="0"/>
+            <a:endParaRPr lang="en-US" altLang="zh-CN" dirty="0"/>
           </a:p>
           <a:p>
             <a:r>
-              <a:rPr lang="zh-CN" altLang="en-US" dirty="0" smtClean="0"/>
+              <a:rPr lang="zh-CN" altLang="en-US" dirty="0"/>
               <a:t>高速缓存</a:t>
             </a:r>
             <a:r>
-              <a:rPr lang="en-US" altLang="zh-CN" dirty="0" smtClean="0"/>
+              <a:rPr lang="en-US" altLang="zh-CN" dirty="0"/>
               <a:t>cache</a:t>
             </a:r>
           </a:p>
           <a:p>
             <a:r>
-              <a:rPr lang="zh-CN" altLang="en-US" dirty="0" smtClean="0"/>
+              <a:rPr lang="zh-CN" altLang="en-US" dirty="0"/>
               <a:t>内存</a:t>
             </a:r>
-            <a:endParaRPr lang="en-US" altLang="zh-CN" dirty="0" smtClean="0"/>
+            <a:endParaRPr lang="en-US" altLang="zh-CN" dirty="0"/>
           </a:p>
           <a:p>
             <a:r>
-              <a:rPr lang="zh-CN" altLang="en-US" dirty="0" smtClean="0"/>
+              <a:rPr lang="zh-CN" altLang="en-US" dirty="0"/>
               <a:t>外部存储设备（磁盘</a:t>
             </a:r>
             <a:r>
-              <a:rPr lang="en-US" altLang="zh-CN" dirty="0" smtClean="0"/>
+              <a:rPr lang="en-US" altLang="zh-CN" dirty="0"/>
               <a:t>/</a:t>
             </a:r>
             <a:r>
-              <a:rPr lang="zh-CN" altLang="en-US" dirty="0" smtClean="0"/>
+              <a:rPr lang="zh-CN" altLang="en-US" dirty="0"/>
               <a:t>光盘</a:t>
             </a:r>
             <a:r>
-              <a:rPr lang="en-US" altLang="zh-CN" dirty="0" smtClean="0"/>
+              <a:rPr lang="en-US" altLang="zh-CN" dirty="0"/>
               <a:t>/SSD</a:t>
             </a:r>
             <a:r>
-              <a:rPr lang="zh-CN" altLang="en-US" dirty="0" smtClean="0"/>
+              <a:rPr lang="zh-CN" altLang="en-US" dirty="0"/>
               <a:t>硬盘）</a:t>
             </a:r>
-            <a:endParaRPr lang="en-US" altLang="zh-CN" dirty="0" smtClean="0"/>
+            <a:endParaRPr lang="en-US" altLang="zh-CN" dirty="0"/>
           </a:p>
           <a:p>
             <a:endParaRPr lang="zh-CN" altLang="en-US" dirty="0"/>
@@ -18039,10 +17913,9 @@
           <a:lstStyle/>
           <a:p>
             <a:r>
-              <a:rPr lang="zh-CN" altLang="en-US" dirty="0" smtClean="0"/>
+              <a:rPr lang="zh-CN" altLang="en-US" dirty="0"/>
               <a:t>设备示意</a:t>
             </a:r>
-            <a:endParaRPr lang="zh-CN" altLang="en-US" dirty="0"/>
           </a:p>
         </p:txBody>
       </p:sp>
@@ -18231,7 +18104,6 @@
             <a:headEnd/>
             <a:tailEnd/>
           </a:ln>
-          <a:extLst/>
         </p:spPr>
         <p:style>
           <a:lnRef idx="2">
@@ -20854,7 +20726,7 @@
           <a:lstStyle/>
           <a:p>
             <a:r>
-              <a:rPr lang="en-US" altLang="zh-CN" b="1" dirty="0" smtClean="0">
+              <a:rPr lang="en-US" altLang="zh-CN" b="1" dirty="0">
                 <a:solidFill>
                   <a:srgbClr val="FF0000"/>
                 </a:solidFill>
@@ -20892,7 +20764,7 @@
           <a:lstStyle/>
           <a:p>
             <a:r>
-              <a:rPr lang="en-US" altLang="zh-CN" b="1" dirty="0" smtClean="0">
+              <a:rPr lang="en-US" altLang="zh-CN" b="1" dirty="0">
                 <a:solidFill>
                   <a:srgbClr val="FF0000"/>
                 </a:solidFill>
@@ -20978,7 +20850,7 @@
           <a:lstStyle/>
           <a:p>
             <a:r>
-              <a:rPr lang="en-US" altLang="zh-CN" b="1" dirty="0" smtClean="0">
+              <a:rPr lang="en-US" altLang="zh-CN" b="1" dirty="0">
                 <a:solidFill>
                   <a:srgbClr val="FF0000"/>
                 </a:solidFill>
@@ -21016,10 +20888,9 @@
           <a:lstStyle/>
           <a:p>
             <a:r>
-              <a:rPr lang="zh-CN" altLang="en-US" dirty="0" smtClean="0"/>
+              <a:rPr lang="zh-CN" altLang="en-US" dirty="0"/>
               <a:t>寄存器</a:t>
             </a:r>
-            <a:endParaRPr lang="zh-CN" altLang="en-US" dirty="0"/>
           </a:p>
         </p:txBody>
       </p:sp>
@@ -21046,7 +20917,7 @@
           <a:lstStyle/>
           <a:p>
             <a:r>
-              <a:rPr lang="en-US" altLang="zh-CN" dirty="0" smtClean="0"/>
+              <a:rPr lang="en-US" altLang="zh-CN" dirty="0"/>
               <a:t>Cache</a:t>
             </a:r>
             <a:endParaRPr lang="zh-CN" altLang="en-US" dirty="0"/>
@@ -21171,10 +21042,9 @@
           <a:lstStyle/>
           <a:p>
             <a:r>
-              <a:rPr lang="zh-CN" altLang="en-US" dirty="0" smtClean="0"/>
+              <a:rPr lang="zh-CN" altLang="en-US" dirty="0"/>
               <a:t>一个简单的程序</a:t>
             </a:r>
-            <a:endParaRPr lang="zh-CN" altLang="en-US" dirty="0"/>
           </a:p>
         </p:txBody>
       </p:sp>
@@ -21197,11 +21067,11 @@
               <a:buNone/>
             </a:pPr>
             <a:r>
-              <a:rPr lang="en-US" altLang="zh-CN" dirty="0" err="1" smtClean="0"/>
+              <a:rPr lang="en-US" altLang="zh-CN" dirty="0" err="1"/>
               <a:t>int</a:t>
             </a:r>
             <a:r>
-              <a:rPr lang="en-US" altLang="zh-CN" dirty="0" smtClean="0"/>
+              <a:rPr lang="en-US" altLang="zh-CN" dirty="0"/>
               <a:t> a = 10, b = 15;</a:t>
             </a:r>
           </a:p>
@@ -21210,11 +21080,11 @@
               <a:buNone/>
             </a:pPr>
             <a:r>
-              <a:rPr lang="en-US" altLang="zh-CN" dirty="0" err="1" smtClean="0"/>
+              <a:rPr lang="en-US" altLang="zh-CN" dirty="0" err="1"/>
               <a:t>int</a:t>
             </a:r>
             <a:r>
-              <a:rPr lang="en-US" altLang="zh-CN" dirty="0" smtClean="0"/>
+              <a:rPr lang="en-US" altLang="zh-CN" dirty="0"/>
               <a:t> sum = a + b;</a:t>
             </a:r>
             <a:endParaRPr lang="zh-CN" altLang="en-US" dirty="0"/>
@@ -21268,13 +21138,8 @@
           <a:p>
             <a:r>
               <a:rPr lang="zh-CN" altLang="en-US" dirty="0"/>
-              <a:t>计算</a:t>
+              <a:t>计算示意</a:t>
             </a:r>
-            <a:r>
-              <a:rPr lang="zh-CN" altLang="en-US" dirty="0" smtClean="0"/>
-              <a:t>示意</a:t>
-            </a:r>
-            <a:endParaRPr lang="zh-CN" altLang="en-US" dirty="0"/>
           </a:p>
         </p:txBody>
       </p:sp>
@@ -21438,10 +21303,9 @@
             <a:p>
               <a:pPr algn="ctr"/>
               <a:r>
-                <a:rPr lang="en-US" altLang="zh-CN" dirty="0" smtClean="0"/>
+                <a:rPr lang="en-US" altLang="zh-CN" dirty="0"/>
                 <a:t>10</a:t>
               </a:r>
-              <a:endParaRPr lang="en-US" altLang="zh-CN" dirty="0"/>
             </a:p>
           </p:txBody>
         </p:sp>
@@ -21467,7 +21331,6 @@
             <a:headEnd/>
             <a:tailEnd/>
           </a:ln>
-          <a:extLst/>
         </p:spPr>
         <p:style>
           <a:lnRef idx="2">
@@ -22021,13 +21884,8 @@
                   <a:pPr algn="ctr"/>
                   <a:r>
                     <a:rPr lang="en-US" altLang="zh-CN" dirty="0"/>
-                    <a:t>b</a:t>
+                    <a:t>b:15</a:t>
                   </a:r>
-                  <a:r>
-                    <a:rPr lang="en-US" altLang="zh-CN" dirty="0" smtClean="0"/>
-                    <a:t>:15</a:t>
-                  </a:r>
-                  <a:endParaRPr lang="en-US" altLang="zh-CN" dirty="0"/>
                 </a:p>
               </p:txBody>
             </p:sp>
@@ -22122,10 +21980,9 @@
                 <a:p>
                   <a:pPr algn="ctr"/>
                   <a:r>
-                    <a:rPr lang="en-US" altLang="zh-CN" dirty="0" smtClean="0"/>
+                    <a:rPr lang="en-US" altLang="zh-CN" dirty="0"/>
                     <a:t>a:10</a:t>
                   </a:r>
-                  <a:endParaRPr lang="en-US" altLang="zh-CN" dirty="0"/>
                 </a:p>
               </p:txBody>
             </p:sp>
@@ -24102,7 +23959,7 @@
           <a:lstStyle/>
           <a:p>
             <a:r>
-              <a:rPr lang="en-US" altLang="zh-CN" b="1" dirty="0" smtClean="0">
+              <a:rPr lang="en-US" altLang="zh-CN" b="1" dirty="0">
                 <a:solidFill>
                   <a:srgbClr val="FF0000"/>
                 </a:solidFill>
@@ -24140,7 +23997,7 @@
           <a:lstStyle/>
           <a:p>
             <a:r>
-              <a:rPr lang="en-US" altLang="zh-CN" b="1" dirty="0" smtClean="0">
+              <a:rPr lang="en-US" altLang="zh-CN" b="1" dirty="0">
                 <a:solidFill>
                   <a:srgbClr val="FF0000"/>
                 </a:solidFill>
@@ -24241,13 +24098,8 @@
           <a:p>
             <a:r>
               <a:rPr lang="zh-CN" altLang="en-US" dirty="0"/>
-              <a:t>计算</a:t>
+              <a:t>计算示意</a:t>
             </a:r>
-            <a:r>
-              <a:rPr lang="zh-CN" altLang="en-US" dirty="0" smtClean="0"/>
-              <a:t>示意</a:t>
-            </a:r>
-            <a:endParaRPr lang="zh-CN" altLang="en-US" dirty="0"/>
           </a:p>
         </p:txBody>
       </p:sp>
@@ -24411,10 +24263,9 @@
             <a:p>
               <a:pPr algn="ctr"/>
               <a:r>
-                <a:rPr lang="en-US" altLang="zh-CN" dirty="0" smtClean="0"/>
+                <a:rPr lang="en-US" altLang="zh-CN" dirty="0"/>
                 <a:t>25</a:t>
               </a:r>
-              <a:endParaRPr lang="en-US" altLang="zh-CN" dirty="0"/>
             </a:p>
           </p:txBody>
         </p:sp>
@@ -24440,7 +24291,6 @@
             <a:headEnd/>
             <a:tailEnd/>
           </a:ln>
-          <a:extLst/>
         </p:spPr>
         <p:style>
           <a:lnRef idx="2">
@@ -24993,10 +24843,9 @@
                 <a:p>
                   <a:pPr algn="ctr"/>
                   <a:r>
-                    <a:rPr lang="en-US" altLang="zh-CN" dirty="0" smtClean="0"/>
+                    <a:rPr lang="en-US" altLang="zh-CN" dirty="0"/>
                     <a:t>b:15</a:t>
                   </a:r>
-                  <a:endParaRPr lang="en-US" altLang="zh-CN" dirty="0"/>
                 </a:p>
               </p:txBody>
             </p:sp>
@@ -25091,10 +24940,9 @@
                 <a:p>
                   <a:pPr algn="ctr"/>
                   <a:r>
-                    <a:rPr lang="en-US" altLang="zh-CN" dirty="0" smtClean="0"/>
+                    <a:rPr lang="en-US" altLang="zh-CN" dirty="0"/>
                     <a:t>a:10</a:t>
                   </a:r>
-                  <a:endParaRPr lang="en-US" altLang="zh-CN" dirty="0"/>
                 </a:p>
               </p:txBody>
             </p:sp>
@@ -27071,7 +26919,7 @@
           <a:lstStyle/>
           <a:p>
             <a:r>
-              <a:rPr lang="en-US" altLang="zh-CN" b="1" dirty="0" smtClean="0">
+              <a:rPr lang="en-US" altLang="zh-CN" b="1" dirty="0">
                 <a:solidFill>
                   <a:srgbClr val="FF0000"/>
                 </a:solidFill>
@@ -27109,7 +26957,7 @@
           <a:lstStyle/>
           <a:p>
             <a:r>
-              <a:rPr lang="en-US" altLang="zh-CN" b="1" dirty="0" smtClean="0">
+              <a:rPr lang="en-US" altLang="zh-CN" b="1" dirty="0">
                 <a:solidFill>
                   <a:srgbClr val="FF0000"/>
                 </a:solidFill>
@@ -27209,13 +27057,8 @@
           <a:p>
             <a:r>
               <a:rPr lang="zh-CN" altLang="en-US" dirty="0"/>
-              <a:t>计算</a:t>
+              <a:t>计算示意</a:t>
             </a:r>
-            <a:r>
-              <a:rPr lang="zh-CN" altLang="en-US" dirty="0" smtClean="0"/>
-              <a:t>示意</a:t>
-            </a:r>
-            <a:endParaRPr lang="zh-CN" altLang="en-US" dirty="0"/>
           </a:p>
         </p:txBody>
       </p:sp>
@@ -27379,10 +27222,9 @@
             <a:p>
               <a:pPr algn="ctr"/>
               <a:r>
-                <a:rPr lang="en-US" altLang="zh-CN" dirty="0" smtClean="0"/>
+                <a:rPr lang="en-US" altLang="zh-CN" dirty="0"/>
                 <a:t>25</a:t>
               </a:r>
-              <a:endParaRPr lang="en-US" altLang="zh-CN" dirty="0"/>
             </a:p>
           </p:txBody>
         </p:sp>
@@ -27408,7 +27250,6 @@
             <a:headEnd/>
             <a:tailEnd/>
           </a:ln>
-          <a:extLst/>
         </p:spPr>
         <p:style>
           <a:lnRef idx="2">
@@ -27961,10 +27802,9 @@
                 <a:p>
                   <a:pPr algn="ctr"/>
                   <a:r>
-                    <a:rPr lang="en-US" altLang="zh-CN" dirty="0" smtClean="0"/>
+                    <a:rPr lang="en-US" altLang="zh-CN" dirty="0"/>
                     <a:t>b:15</a:t>
                   </a:r>
-                  <a:endParaRPr lang="en-US" altLang="zh-CN" dirty="0"/>
                 </a:p>
               </p:txBody>
             </p:sp>
@@ -28012,10 +27852,9 @@
                 <a:p>
                   <a:pPr algn="ctr"/>
                   <a:r>
-                    <a:rPr lang="en-US" altLang="zh-CN" dirty="0" smtClean="0"/>
+                    <a:rPr lang="en-US" altLang="zh-CN" dirty="0"/>
                     <a:t>sum</a:t>
                   </a:r>
-                  <a:endParaRPr lang="en-US" altLang="zh-CN" dirty="0"/>
                 </a:p>
               </p:txBody>
             </p:sp>
@@ -28063,10 +27902,9 @@
                 <a:p>
                   <a:pPr algn="ctr"/>
                   <a:r>
-                    <a:rPr lang="en-US" altLang="zh-CN" dirty="0" smtClean="0"/>
+                    <a:rPr lang="en-US" altLang="zh-CN" dirty="0"/>
                     <a:t>a:10</a:t>
                   </a:r>
-                  <a:endParaRPr lang="en-US" altLang="zh-CN" dirty="0"/>
                 </a:p>
               </p:txBody>
             </p:sp>
@@ -30043,7 +29881,7 @@
           <a:lstStyle/>
           <a:p>
             <a:r>
-              <a:rPr lang="en-US" altLang="zh-CN" b="1" dirty="0" smtClean="0">
+              <a:rPr lang="en-US" altLang="zh-CN" b="1" dirty="0">
                 <a:solidFill>
                   <a:srgbClr val="FF0000"/>
                 </a:solidFill>
@@ -30081,7 +29919,7 @@
           <a:lstStyle/>
           <a:p>
             <a:r>
-              <a:rPr lang="en-US" altLang="zh-CN" b="1" dirty="0" smtClean="0">
+              <a:rPr lang="en-US" altLang="zh-CN" b="1" dirty="0">
                 <a:solidFill>
                   <a:srgbClr val="FF0000"/>
                 </a:solidFill>
@@ -30180,10 +30018,9 @@
           <a:lstStyle/>
           <a:p>
             <a:r>
-              <a:rPr lang="zh-CN" altLang="en-US" dirty="0" smtClean="0"/>
+              <a:rPr lang="zh-CN" altLang="en-US" dirty="0"/>
               <a:t>如何进行效率比较？</a:t>
             </a:r>
-            <a:endParaRPr lang="zh-CN" altLang="en-US" dirty="0"/>
           </a:p>
         </p:txBody>
       </p:sp>
@@ -30203,10 +30040,9 @@
           <a:lstStyle/>
           <a:p>
             <a:r>
-              <a:rPr lang="zh-CN" altLang="en-US" dirty="0" smtClean="0"/>
+              <a:rPr lang="zh-CN" altLang="en-US" dirty="0"/>
               <a:t>多次执行看总体的时间消耗</a:t>
             </a:r>
-            <a:endParaRPr lang="zh-CN" altLang="en-US" dirty="0"/>
           </a:p>
         </p:txBody>
       </p:sp>
@@ -30256,10 +30092,9 @@
           <a:lstStyle/>
           <a:p>
             <a:r>
-              <a:rPr lang="zh-CN" altLang="en-US" dirty="0" smtClean="0"/>
+              <a:rPr lang="zh-CN" altLang="en-US" dirty="0"/>
               <a:t>寄存器</a:t>
             </a:r>
-            <a:endParaRPr lang="zh-CN" altLang="en-US" dirty="0"/>
           </a:p>
         </p:txBody>
       </p:sp>
@@ -30279,7 +30114,7 @@
           <a:lstStyle/>
           <a:p>
             <a:r>
-              <a:rPr lang="en-US" altLang="zh-CN" dirty="0" smtClean="0"/>
+              <a:rPr lang="en-US" altLang="zh-CN" dirty="0"/>
               <a:t>Register</a:t>
             </a:r>
           </a:p>
@@ -30295,11 +30130,7 @@
             </a:r>
             <a:r>
               <a:rPr lang="en-US" altLang="zh-CN" dirty="0"/>
-              <a:t> a = </a:t>
-            </a:r>
-            <a:r>
-              <a:rPr lang="en-US" altLang="zh-CN" dirty="0" smtClean="0"/>
-              <a:t>220;</a:t>
+              <a:t> a = 220;</a:t>
             </a:r>
           </a:p>
           <a:p>
@@ -30314,19 +30145,7 @@
             </a:r>
             <a:r>
               <a:rPr lang="en-US" altLang="zh-CN" dirty="0"/>
-              <a:t> </a:t>
-            </a:r>
-            <a:r>
-              <a:rPr lang="en-US" altLang="zh-CN" dirty="0" smtClean="0"/>
-              <a:t>b </a:t>
-            </a:r>
-            <a:r>
-              <a:rPr lang="en-US" altLang="zh-CN" dirty="0"/>
-              <a:t>= 100</a:t>
-            </a:r>
-            <a:r>
-              <a:rPr lang="en-US" altLang="zh-CN" dirty="0" smtClean="0"/>
-              <a:t>;</a:t>
+              <a:t> b = 100;</a:t>
             </a:r>
           </a:p>
           <a:p>
@@ -30336,16 +30155,15 @@
           <a:p>
             <a:pPr lvl="1"/>
             <a:r>
-              <a:rPr lang="en-US" altLang="zh-CN" dirty="0" smtClean="0"/>
+              <a:rPr lang="en-US" altLang="zh-CN" dirty="0"/>
               <a:t>a + b</a:t>
             </a:r>
-            <a:endParaRPr lang="en-US" altLang="zh-CN" dirty="0"/>
           </a:p>
           <a:p>
             <a:pPr marL="457200" lvl="1" indent="0">
               <a:buNone/>
             </a:pPr>
-            <a:endParaRPr lang="en-US" altLang="zh-CN" dirty="0" smtClean="0"/>
+            <a:endParaRPr lang="en-US" altLang="zh-CN" dirty="0"/>
           </a:p>
           <a:p>
             <a:pPr lvl="1"/>

</xml_diff>